<commit_message>
Js fini, css fini, html fini et reecriture de certaine div
</commit_message>
<xml_diff>
--- a/CV.pptx
+++ b/CV.pptx
@@ -243,7 +243,7 @@
           <a:p>
             <a:fld id="{4DC395A8-58A8-CE4E-B586-3B2109BC853C}" type="datetimeFigureOut">
               <a:rPr lang="fr-FR" smtClean="0"/>
-              <a:t>04/02/2019</a:t>
+              <a:t>18/02/2019</a:t>
             </a:fld>
             <a:endParaRPr lang="fr-FR"/>
           </a:p>
@@ -408,7 +408,7 @@
           <a:p>
             <a:fld id="{4DC395A8-58A8-CE4E-B586-3B2109BC853C}" type="datetimeFigureOut">
               <a:rPr lang="fr-FR" smtClean="0"/>
-              <a:t>04/02/2019</a:t>
+              <a:t>18/02/2019</a:t>
             </a:fld>
             <a:endParaRPr lang="fr-FR"/>
           </a:p>
@@ -583,7 +583,7 @@
           <a:p>
             <a:fld id="{4DC395A8-58A8-CE4E-B586-3B2109BC853C}" type="datetimeFigureOut">
               <a:rPr lang="fr-FR" smtClean="0"/>
-              <a:t>04/02/2019</a:t>
+              <a:t>18/02/2019</a:t>
             </a:fld>
             <a:endParaRPr lang="fr-FR"/>
           </a:p>
@@ -748,7 +748,7 @@
           <a:p>
             <a:fld id="{4DC395A8-58A8-CE4E-B586-3B2109BC853C}" type="datetimeFigureOut">
               <a:rPr lang="fr-FR" smtClean="0"/>
-              <a:t>04/02/2019</a:t>
+              <a:t>18/02/2019</a:t>
             </a:fld>
             <a:endParaRPr lang="fr-FR"/>
           </a:p>
@@ -987,7 +987,7 @@
           <a:p>
             <a:fld id="{4DC395A8-58A8-CE4E-B586-3B2109BC853C}" type="datetimeFigureOut">
               <a:rPr lang="fr-FR" smtClean="0"/>
-              <a:t>04/02/2019</a:t>
+              <a:t>18/02/2019</a:t>
             </a:fld>
             <a:endParaRPr lang="fr-FR"/>
           </a:p>
@@ -1214,7 +1214,7 @@
           <a:p>
             <a:fld id="{4DC395A8-58A8-CE4E-B586-3B2109BC853C}" type="datetimeFigureOut">
               <a:rPr lang="fr-FR" smtClean="0"/>
-              <a:t>04/02/2019</a:t>
+              <a:t>18/02/2019</a:t>
             </a:fld>
             <a:endParaRPr lang="fr-FR"/>
           </a:p>
@@ -1576,7 +1576,7 @@
           <a:p>
             <a:fld id="{4DC395A8-58A8-CE4E-B586-3B2109BC853C}" type="datetimeFigureOut">
               <a:rPr lang="fr-FR" smtClean="0"/>
-              <a:t>04/02/2019</a:t>
+              <a:t>18/02/2019</a:t>
             </a:fld>
             <a:endParaRPr lang="fr-FR"/>
           </a:p>
@@ -1689,7 +1689,7 @@
           <a:p>
             <a:fld id="{4DC395A8-58A8-CE4E-B586-3B2109BC853C}" type="datetimeFigureOut">
               <a:rPr lang="fr-FR" smtClean="0"/>
-              <a:t>04/02/2019</a:t>
+              <a:t>18/02/2019</a:t>
             </a:fld>
             <a:endParaRPr lang="fr-FR"/>
           </a:p>
@@ -1779,7 +1779,7 @@
           <a:p>
             <a:fld id="{4DC395A8-58A8-CE4E-B586-3B2109BC853C}" type="datetimeFigureOut">
               <a:rPr lang="fr-FR" smtClean="0"/>
-              <a:t>04/02/2019</a:t>
+              <a:t>18/02/2019</a:t>
             </a:fld>
             <a:endParaRPr lang="fr-FR"/>
           </a:p>
@@ -2051,7 +2051,7 @@
           <a:p>
             <a:fld id="{4DC395A8-58A8-CE4E-B586-3B2109BC853C}" type="datetimeFigureOut">
               <a:rPr lang="fr-FR" smtClean="0"/>
-              <a:t>04/02/2019</a:t>
+              <a:t>18/02/2019</a:t>
             </a:fld>
             <a:endParaRPr lang="fr-FR"/>
           </a:p>
@@ -2303,7 +2303,7 @@
           <a:p>
             <a:fld id="{4DC395A8-58A8-CE4E-B586-3B2109BC853C}" type="datetimeFigureOut">
               <a:rPr lang="fr-FR" smtClean="0"/>
-              <a:t>04/02/2019</a:t>
+              <a:t>18/02/2019</a:t>
             </a:fld>
             <a:endParaRPr lang="fr-FR"/>
           </a:p>
@@ -2511,7 +2511,7 @@
           <a:p>
             <a:fld id="{4DC395A8-58A8-CE4E-B586-3B2109BC853C}" type="datetimeFigureOut">
               <a:rPr lang="fr-FR" smtClean="0"/>
-              <a:t>04/02/2019</a:t>
+              <a:t>18/02/2019</a:t>
             </a:fld>
             <a:endParaRPr lang="fr-FR"/>
           </a:p>
@@ -3090,7 +3090,7 @@
         <p:spPr>
           <a:xfrm>
             <a:off x="212396" y="4095097"/>
-            <a:ext cx="2872635" cy="769441"/>
+            <a:ext cx="2872635" cy="1107996"/>
           </a:xfrm>
           <a:prstGeom prst="rect">
             <a:avLst/>
@@ -3104,6 +3104,45 @@
           <a:lstStyle/>
           <a:p>
             <a:r>
+              <a:rPr lang="en-PH" sz="1100" dirty="0">
+                <a:solidFill>
+                  <a:schemeClr val="tx1">
+                    <a:lumMod val="75000"/>
+                    <a:lumOff val="25000"/>
+                  </a:schemeClr>
+                </a:solidFill>
+                <a:cs typeface="Lato" panose="020F0502020204030203" pitchFamily="34" charset="0"/>
+              </a:rPr>
+              <a:t>14 rue de la République </a:t>
+            </a:r>
+          </a:p>
+          <a:p>
+            <a:r>
+              <a:rPr lang="en-PH" sz="1100" dirty="0">
+                <a:solidFill>
+                  <a:schemeClr val="tx1">
+                    <a:lumMod val="75000"/>
+                    <a:lumOff val="25000"/>
+                  </a:schemeClr>
+                </a:solidFill>
+                <a:cs typeface="Lato" panose="020F0502020204030203" pitchFamily="34" charset="0"/>
+              </a:rPr>
+              <a:t>69002 Lyon</a:t>
+            </a:r>
+          </a:p>
+          <a:p>
+            <a:endParaRPr lang="en-PH" sz="1100" dirty="0">
+              <a:solidFill>
+                <a:schemeClr val="tx1">
+                  <a:lumMod val="75000"/>
+                  <a:lumOff val="25000"/>
+                </a:schemeClr>
+              </a:solidFill>
+              <a:cs typeface="Lato" panose="020F0502020204030203" pitchFamily="34" charset="0"/>
+            </a:endParaRPr>
+          </a:p>
+          <a:p>
+            <a:r>
               <a:rPr lang="en-GB" sz="1100" dirty="0">
                 <a:solidFill>
                   <a:schemeClr val="tx1">
@@ -3113,22 +3152,21 @@
                 </a:solidFill>
                 <a:cs typeface="Lato" panose="020F0502020204030203" pitchFamily="34" charset="0"/>
               </a:rPr>
-              <a:t>Mobile : 0604487732</a:t>
-            </a:r>
-          </a:p>
-          <a:p>
-            <a:r>
-              <a:rPr lang="en-PH" sz="1100" dirty="0" err="1">
-                <a:solidFill>
-                  <a:schemeClr val="tx1">
-                    <a:lumMod val="75000"/>
-                    <a:lumOff val="25000"/>
-                  </a:schemeClr>
-                </a:solidFill>
-                <a:cs typeface="Lato" panose="020F0502020204030203" pitchFamily="34" charset="0"/>
-              </a:rPr>
-              <a:t>Adresse</a:t>
-            </a:r>
+              <a:t>0604487732</a:t>
+            </a:r>
+          </a:p>
+          <a:p>
+            <a:endParaRPr lang="en-PH" sz="1100" dirty="0">
+              <a:solidFill>
+                <a:schemeClr val="tx1">
+                  <a:lumMod val="75000"/>
+                  <a:lumOff val="25000"/>
+                </a:schemeClr>
+              </a:solidFill>
+              <a:cs typeface="Lato" panose="020F0502020204030203" pitchFamily="34" charset="0"/>
+            </a:endParaRPr>
+          </a:p>
+          <a:p>
             <a:r>
               <a:rPr lang="en-PH" sz="1100" dirty="0">
                 <a:solidFill>
@@ -3139,59 +3177,7 @@
                 </a:solidFill>
                 <a:cs typeface="Lato" panose="020F0502020204030203" pitchFamily="34" charset="0"/>
               </a:rPr>
-              <a:t> : 14 rue de la </a:t>
-            </a:r>
-            <a:r>
-              <a:rPr lang="en-PH" sz="1100" dirty="0" err="1">
-                <a:solidFill>
-                  <a:schemeClr val="tx1">
-                    <a:lumMod val="75000"/>
-                    <a:lumOff val="25000"/>
-                  </a:schemeClr>
-                </a:solidFill>
-                <a:cs typeface="Lato" panose="020F0502020204030203" pitchFamily="34" charset="0"/>
-              </a:rPr>
-              <a:t>République</a:t>
-            </a:r>
-            <a:r>
-              <a:rPr lang="en-PH" sz="1100" dirty="0">
-                <a:solidFill>
-                  <a:schemeClr val="tx1">
-                    <a:lumMod val="75000"/>
-                    <a:lumOff val="25000"/>
-                  </a:schemeClr>
-                </a:solidFill>
-                <a:cs typeface="Lato" panose="020F0502020204030203" pitchFamily="34" charset="0"/>
-              </a:rPr>
-              <a:t> </a:t>
-            </a:r>
-          </a:p>
-          <a:p>
-            <a:r>
-              <a:rPr lang="en-PH" sz="1100" dirty="0">
-                <a:solidFill>
-                  <a:schemeClr val="tx1">
-                    <a:lumMod val="75000"/>
-                    <a:lumOff val="25000"/>
-                  </a:schemeClr>
-                </a:solidFill>
-                <a:cs typeface="Lato" panose="020F0502020204030203" pitchFamily="34" charset="0"/>
-              </a:rPr>
-              <a:t>69002 Lyon</a:t>
-            </a:r>
-          </a:p>
-          <a:p>
-            <a:r>
-              <a:rPr lang="en-PH" sz="1100" dirty="0">
-                <a:solidFill>
-                  <a:schemeClr val="tx1">
-                    <a:lumMod val="75000"/>
-                    <a:lumOff val="25000"/>
-                  </a:schemeClr>
-                </a:solidFill>
-                <a:cs typeface="Lato" panose="020F0502020204030203" pitchFamily="34" charset="0"/>
-              </a:rPr>
-              <a:t>Email : thomas.giovannoni@hotmail.fr</a:t>
+              <a:t>thomas.giovannoni@hotmail.fr</a:t>
             </a:r>
           </a:p>
         </p:txBody>
@@ -3771,7 +3757,31 @@
                 </a:solidFill>
                 <a:cs typeface="Lato" panose="020F0502020204030203" pitchFamily="34" charset="0"/>
               </a:rPr>
-              <a:t>- Motive	</a:t>
+              <a:t>- </a:t>
+            </a:r>
+            <a:r>
+              <a:rPr lang="en-GB" sz="1100" dirty="0" err="1">
+                <a:solidFill>
+                  <a:schemeClr val="tx1">
+                    <a:lumMod val="75000"/>
+                    <a:lumOff val="25000"/>
+                  </a:schemeClr>
+                </a:solidFill>
+                <a:cs typeface="Lato" panose="020F0502020204030203" pitchFamily="34" charset="0"/>
+              </a:rPr>
+              <a:t>Motivé</a:t>
+            </a:r>
+            <a:r>
+              <a:rPr lang="en-GB" sz="1100" dirty="0">
+                <a:solidFill>
+                  <a:schemeClr val="tx1">
+                    <a:lumMod val="75000"/>
+                    <a:lumOff val="25000"/>
+                  </a:schemeClr>
+                </a:solidFill>
+                <a:cs typeface="Lato" panose="020F0502020204030203" pitchFamily="34" charset="0"/>
+              </a:rPr>
+              <a:t>	</a:t>
             </a:r>
           </a:p>
         </p:txBody>
@@ -4109,7 +4119,7 @@
         </p:nvGrpSpPr>
         <p:grpSpPr>
           <a:xfrm>
-            <a:off x="3418072" y="2838517"/>
+            <a:off x="3427263" y="6964524"/>
             <a:ext cx="3970457" cy="938719"/>
             <a:chOff x="3318928" y="3690328"/>
             <a:chExt cx="4089578" cy="938719"/>
@@ -4213,7 +4223,7 @@
                   <a:ea typeface="Lato" charset="0"/>
                   <a:cs typeface="Lato" charset="0"/>
                 </a:rPr>
-                <a:t>Tout du long de ce projet j’ai eut à communiquer des informations entre les différents lead des différents pôles.</a:t>
+                <a:t>Tout du long de ce projet j’ai eu à communiquer des informations entre les différents lead des différents pôles.</a:t>
               </a:r>
             </a:p>
           </p:txBody>
@@ -4227,7 +4237,7 @@
         </p:nvGrpSpPr>
         <p:grpSpPr>
           <a:xfrm>
-            <a:off x="3418072" y="4183392"/>
+            <a:off x="3409416" y="2907874"/>
             <a:ext cx="4089578" cy="1107996"/>
             <a:chOff x="3318928" y="3690328"/>
             <a:chExt cx="4089578" cy="1107996"/>
@@ -4290,7 +4300,7 @@
                 <a:rPr lang="en-GB" sz="1100" dirty="0">
                   <a:cs typeface="Lato" panose="020F0502020204030203" pitchFamily="34" charset="0"/>
                 </a:rPr>
-                <a:t>Y-days ( </a:t>
+                <a:t>Y-days (</a:t>
               </a:r>
               <a:r>
                 <a:rPr lang="en-GB" sz="1100" dirty="0" err="1">
@@ -4314,7 +4324,7 @@
                 <a:rPr lang="en-GB" sz="1100" dirty="0">
                   <a:cs typeface="Lato" panose="020F0502020204030203" pitchFamily="34" charset="0"/>
                 </a:rPr>
-                <a:t> )</a:t>
+                <a:t>)</a:t>
               </a:r>
             </a:p>
             <a:p>
@@ -4396,7 +4406,7 @@
         </p:nvGrpSpPr>
         <p:grpSpPr>
           <a:xfrm>
-            <a:off x="3418072" y="5528267"/>
+            <a:off x="3427263" y="4319535"/>
             <a:ext cx="4089578" cy="938719"/>
             <a:chOff x="3318928" y="3690328"/>
             <a:chExt cx="4089578" cy="938719"/>
@@ -4465,7 +4475,7 @@
                 <a:rPr lang="en-GB" sz="1100" dirty="0" err="1">
                   <a:cs typeface="Lato" panose="020F0502020204030203" pitchFamily="34" charset="0"/>
                 </a:rPr>
-                <a:t>connecté</a:t>
+                <a:t>connectée</a:t>
               </a:r>
               <a:endParaRPr lang="en-GB" sz="1100" dirty="0">
                 <a:cs typeface="Lato" panose="020F0502020204030203" pitchFamily="34" charset="0"/>
@@ -4533,7 +4543,7 @@
         </p:nvGrpSpPr>
         <p:grpSpPr>
           <a:xfrm>
-            <a:off x="3418072" y="6873143"/>
+            <a:off x="3427784" y="5595525"/>
             <a:ext cx="4089578" cy="1107996"/>
             <a:chOff x="3318928" y="3690328"/>
             <a:chExt cx="4089578" cy="1107996"/>
@@ -4640,7 +4650,7 @@
                   <a:ea typeface="Lato" charset="0"/>
                   <a:cs typeface="Lato" charset="0"/>
                 </a:rPr>
-                <a:t> et surtout Javascript il m’a permit d’apprendre beaucoup de chose dans les langages utilisés.</a:t>
+                <a:t> et surtout Javascript il m’a permis d’apprendre beaucoup de choses dans les langages utilisés.</a:t>
               </a:r>
               <a:endParaRPr lang="fr-FR" sz="1200" dirty="0">
                 <a:ea typeface="Lato" charset="0"/>
@@ -4695,8 +4705,8 @@
         </p:nvSpPr>
         <p:spPr>
           <a:xfrm>
-            <a:off x="3543993" y="8494643"/>
-            <a:ext cx="2429640" cy="538609"/>
+            <a:off x="3543992" y="9828822"/>
+            <a:ext cx="2713923" cy="569387"/>
           </a:xfrm>
           <a:prstGeom prst="rect">
             <a:avLst/>
@@ -4755,8 +4765,53 @@
                 </a:solidFill>
                 <a:cs typeface="Lato" panose="020F0502020204030203" pitchFamily="34" charset="0"/>
               </a:rPr>
-              <a:t> Sti2D</a:t>
-            </a:r>
+              <a:t> Sti2D </a:t>
+            </a:r>
+            <a:r>
+              <a:rPr lang="en-PH" sz="1100" dirty="0" err="1">
+                <a:solidFill>
+                  <a:schemeClr val="tx1">
+                    <a:lumMod val="75000"/>
+                    <a:lumOff val="25000"/>
+                  </a:schemeClr>
+                </a:solidFill>
+                <a:cs typeface="Lato" panose="020F0502020204030203" pitchFamily="34" charset="0"/>
+              </a:rPr>
+              <a:t>Système</a:t>
+            </a:r>
+            <a:r>
+              <a:rPr lang="en-PH" sz="1100" dirty="0">
+                <a:solidFill>
+                  <a:schemeClr val="tx1">
+                    <a:lumMod val="75000"/>
+                    <a:lumOff val="25000"/>
+                  </a:schemeClr>
+                </a:solidFill>
+                <a:cs typeface="Lato" panose="020F0502020204030203" pitchFamily="34" charset="0"/>
+              </a:rPr>
+              <a:t> Informatique et </a:t>
+            </a:r>
+            <a:r>
+              <a:rPr lang="en-PH" sz="1100" dirty="0" err="1">
+                <a:solidFill>
+                  <a:schemeClr val="tx1">
+                    <a:lumMod val="75000"/>
+                    <a:lumOff val="25000"/>
+                  </a:schemeClr>
+                </a:solidFill>
+                <a:cs typeface="Lato" panose="020F0502020204030203" pitchFamily="34" charset="0"/>
+              </a:rPr>
+              <a:t>numérique</a:t>
+            </a:r>
+            <a:endParaRPr lang="en-PH" sz="1100" dirty="0">
+              <a:solidFill>
+                <a:schemeClr val="tx1">
+                  <a:lumMod val="75000"/>
+                  <a:lumOff val="25000"/>
+                </a:schemeClr>
+              </a:solidFill>
+              <a:cs typeface="Lato" panose="020F0502020204030203" pitchFamily="34" charset="0"/>
+            </a:endParaRPr>
           </a:p>
           <a:p>
             <a:r>
@@ -4842,7 +4897,7 @@
         </p:nvSpPr>
         <p:spPr>
           <a:xfrm>
-            <a:off x="6372133" y="8603479"/>
+            <a:off x="6372133" y="9937658"/>
             <a:ext cx="922971" cy="261610"/>
           </a:xfrm>
           <a:prstGeom prst="rect">
@@ -4941,15 +4996,6 @@
               </a:rPr>
               <a:t> Game Design</a:t>
             </a:r>
-            <a:endParaRPr lang="en-PH" sz="900" dirty="0">
-              <a:solidFill>
-                <a:schemeClr val="tx1">
-                  <a:lumMod val="75000"/>
-                  <a:lumOff val="25000"/>
-                </a:schemeClr>
-              </a:solidFill>
-              <a:cs typeface="Lato" panose="020F0502020204030203" pitchFamily="34" charset="0"/>
-            </a:endParaRPr>
           </a:p>
           <a:p>
             <a:r>
@@ -5116,7 +5162,7 @@
               <a:rPr lang="en-GB" sz="2200" dirty="0" err="1">
                 <a:cs typeface="Lato" panose="020F0502020204030203" pitchFamily="34" charset="0"/>
               </a:rPr>
-              <a:t>dévloppement</a:t>
+              <a:t>développement</a:t>
             </a:r>
             <a:endParaRPr lang="en-GB" sz="2200" dirty="0">
               <a:cs typeface="Lato" panose="020F0502020204030203" pitchFamily="34" charset="0"/>
@@ -5562,142 +5608,6 @@
           </p:txBody>
         </p:sp>
       </p:grpSp>
-      <p:sp>
-        <p:nvSpPr>
-          <p:cNvPr id="109" name="TextBox 88">
-            <a:extLst>
-              <a:ext uri="{FF2B5EF4-FFF2-40B4-BE49-F238E27FC236}">
-                <a16:creationId xmlns:a16="http://schemas.microsoft.com/office/drawing/2014/main" id="{B0F54326-61E3-41FE-A693-319BB2DCFCCE}"/>
-              </a:ext>
-            </a:extLst>
-          </p:cNvPr>
-          <p:cNvSpPr txBox="1"/>
-          <p:nvPr/>
-        </p:nvSpPr>
-        <p:spPr>
-          <a:xfrm>
-            <a:off x="3536492" y="9778634"/>
-            <a:ext cx="2341677" cy="523220"/>
-          </a:xfrm>
-          <a:prstGeom prst="rect">
-            <a:avLst/>
-          </a:prstGeom>
-          <a:noFill/>
-        </p:spPr>
-        <p:txBody>
-          <a:bodyPr wrap="square" rtlCol="0">
-            <a:spAutoFit/>
-          </a:bodyPr>
-          <a:lstStyle/>
-          <a:p>
-            <a:r>
-              <a:rPr lang="fr-FR" sz="1000" dirty="0" err="1">
-                <a:solidFill>
-                  <a:schemeClr val="tx1">
-                    <a:lumMod val="75000"/>
-                    <a:lumOff val="25000"/>
-                  </a:schemeClr>
-                </a:solidFill>
-                <a:cs typeface="Lato" panose="020F0502020204030203" pitchFamily="34" charset="0"/>
-              </a:rPr>
-              <a:t>Ynov</a:t>
-            </a:r>
-            <a:r>
-              <a:rPr lang="fr-FR" sz="1000" dirty="0">
-                <a:solidFill>
-                  <a:schemeClr val="tx1">
-                    <a:lumMod val="75000"/>
-                    <a:lumOff val="25000"/>
-                  </a:schemeClr>
-                </a:solidFill>
-                <a:cs typeface="Lato" panose="020F0502020204030203" pitchFamily="34" charset="0"/>
-              </a:rPr>
-              <a:t> Lyon </a:t>
-            </a:r>
-            <a:r>
-              <a:rPr lang="mr-IN" sz="1000" dirty="0">
-                <a:solidFill>
-                  <a:schemeClr val="tx1">
-                    <a:lumMod val="75000"/>
-                    <a:lumOff val="25000"/>
-                  </a:schemeClr>
-                </a:solidFill>
-                <a:cs typeface="Lato" panose="020F0502020204030203" pitchFamily="34" charset="0"/>
-              </a:rPr>
-              <a:t>–</a:t>
-            </a:r>
-            <a:r>
-              <a:rPr lang="fr-FR" sz="1000" dirty="0">
-                <a:solidFill>
-                  <a:schemeClr val="tx1">
-                    <a:lumMod val="75000"/>
-                    <a:lumOff val="25000"/>
-                  </a:schemeClr>
-                </a:solidFill>
-                <a:cs typeface="Lato" panose="020F0502020204030203" pitchFamily="34" charset="0"/>
-              </a:rPr>
-              <a:t> Ingé supp</a:t>
-            </a:r>
-          </a:p>
-          <a:p>
-            <a:r>
-              <a:rPr lang="fr-FR" sz="900" dirty="0">
-                <a:solidFill>
-                  <a:schemeClr val="tx1">
-                    <a:lumMod val="75000"/>
-                    <a:lumOff val="25000"/>
-                  </a:schemeClr>
-                </a:solidFill>
-                <a:cs typeface="Lato" panose="020F0502020204030203" pitchFamily="34" charset="0"/>
-              </a:rPr>
-              <a:t>Développement web et logiciel principalement en C, C#.</a:t>
-            </a:r>
-          </a:p>
-        </p:txBody>
-      </p:sp>
-      <p:sp>
-        <p:nvSpPr>
-          <p:cNvPr id="112" name="TextBox 89">
-            <a:extLst>
-              <a:ext uri="{FF2B5EF4-FFF2-40B4-BE49-F238E27FC236}">
-                <a16:creationId xmlns:a16="http://schemas.microsoft.com/office/drawing/2014/main" id="{855D6B92-60A4-4C83-88E3-D38C7AF151CB}"/>
-              </a:ext>
-            </a:extLst>
-          </p:cNvPr>
-          <p:cNvSpPr txBox="1"/>
-          <p:nvPr/>
-        </p:nvSpPr>
-        <p:spPr>
-          <a:xfrm>
-            <a:off x="6381661" y="9909439"/>
-            <a:ext cx="892491" cy="261610"/>
-          </a:xfrm>
-          <a:prstGeom prst="rect">
-            <a:avLst/>
-          </a:prstGeom>
-          <a:noFill/>
-        </p:spPr>
-        <p:txBody>
-          <a:bodyPr wrap="square" rtlCol="0">
-            <a:spAutoFit/>
-          </a:bodyPr>
-          <a:lstStyle/>
-          <a:p>
-            <a:r>
-              <a:rPr lang="en-PH" sz="1100" dirty="0">
-                <a:solidFill>
-                  <a:schemeClr val="tx1">
-                    <a:lumMod val="75000"/>
-                    <a:lumOff val="25000"/>
-                  </a:schemeClr>
-                </a:solidFill>
-                <a:cs typeface="Lato" panose="020F0502020204030203" pitchFamily="34" charset="0"/>
-              </a:rPr>
-              <a:t>2018 - 2019</a:t>
-            </a:r>
-          </a:p>
-        </p:txBody>
-      </p:sp>
       <p:pic>
         <p:nvPicPr>
           <p:cNvPr id="1026" name="Picture 2" descr="C:\Users\utilisateur\Documents\Dossiers divers\Thomas\photo identité THOMAS GIOVANNONI - GAME DESIGN.jpg">
@@ -5745,6 +5655,163 @@
           </a:extLst>
         </p:spPr>
       </p:pic>
+      <p:sp>
+        <p:nvSpPr>
+          <p:cNvPr id="57" name="TextBox 88">
+            <a:extLst>
+              <a:ext uri="{FF2B5EF4-FFF2-40B4-BE49-F238E27FC236}">
+                <a16:creationId xmlns:a16="http://schemas.microsoft.com/office/drawing/2014/main" id="{C177D4ED-5DF6-4F70-BCB0-D2B8F6A06B23}"/>
+              </a:ext>
+            </a:extLst>
+          </p:cNvPr>
+          <p:cNvSpPr txBox="1"/>
+          <p:nvPr/>
+        </p:nvSpPr>
+        <p:spPr>
+          <a:xfrm>
+            <a:off x="3549354" y="8484636"/>
+            <a:ext cx="2341677" cy="538609"/>
+          </a:xfrm>
+          <a:prstGeom prst="rect">
+            <a:avLst/>
+          </a:prstGeom>
+          <a:noFill/>
+        </p:spPr>
+        <p:txBody>
+          <a:bodyPr wrap="square" rtlCol="0">
+            <a:spAutoFit/>
+          </a:bodyPr>
+          <a:lstStyle/>
+          <a:p>
+            <a:r>
+              <a:rPr lang="fr-FR" sz="1100" dirty="0" err="1">
+                <a:solidFill>
+                  <a:schemeClr val="tx1">
+                    <a:lumMod val="75000"/>
+                    <a:lumOff val="25000"/>
+                  </a:schemeClr>
+                </a:solidFill>
+                <a:cs typeface="Lato" panose="020F0502020204030203" pitchFamily="34" charset="0"/>
+              </a:rPr>
+              <a:t>Ynov</a:t>
+            </a:r>
+            <a:r>
+              <a:rPr lang="fr-FR" sz="1100" dirty="0">
+                <a:solidFill>
+                  <a:schemeClr val="tx1">
+                    <a:lumMod val="75000"/>
+                    <a:lumOff val="25000"/>
+                  </a:schemeClr>
+                </a:solidFill>
+                <a:cs typeface="Lato" panose="020F0502020204030203" pitchFamily="34" charset="0"/>
+              </a:rPr>
+              <a:t> Lyon </a:t>
+            </a:r>
+            <a:r>
+              <a:rPr lang="mr-IN" sz="1100" dirty="0">
+                <a:solidFill>
+                  <a:schemeClr val="tx1">
+                    <a:lumMod val="75000"/>
+                    <a:lumOff val="25000"/>
+                  </a:schemeClr>
+                </a:solidFill>
+                <a:cs typeface="Lato" panose="020F0502020204030203" pitchFamily="34" charset="0"/>
+              </a:rPr>
+              <a:t>–</a:t>
+            </a:r>
+            <a:r>
+              <a:rPr lang="fr-FR" sz="1100" dirty="0">
+                <a:solidFill>
+                  <a:schemeClr val="tx1">
+                    <a:lumMod val="75000"/>
+                    <a:lumOff val="25000"/>
+                  </a:schemeClr>
+                </a:solidFill>
+                <a:cs typeface="Lato" panose="020F0502020204030203" pitchFamily="34" charset="0"/>
+              </a:rPr>
+              <a:t> </a:t>
+            </a:r>
+            <a:r>
+              <a:rPr lang="fr-FR" sz="1100" dirty="0" err="1">
+                <a:solidFill>
+                  <a:schemeClr val="tx1">
+                    <a:lumMod val="75000"/>
+                    <a:lumOff val="25000"/>
+                  </a:schemeClr>
+                </a:solidFill>
+                <a:cs typeface="Lato" panose="020F0502020204030203" pitchFamily="34" charset="0"/>
+              </a:rPr>
+              <a:t>Ingésup</a:t>
+            </a:r>
+            <a:endParaRPr lang="fr-FR" sz="1100" dirty="0">
+              <a:solidFill>
+                <a:schemeClr val="tx1">
+                  <a:lumMod val="75000"/>
+                  <a:lumOff val="25000"/>
+                </a:schemeClr>
+              </a:solidFill>
+              <a:cs typeface="Lato" panose="020F0502020204030203" pitchFamily="34" charset="0"/>
+            </a:endParaRPr>
+          </a:p>
+          <a:p>
+            <a:r>
+              <a:rPr lang="fr-FR" sz="900" dirty="0">
+                <a:solidFill>
+                  <a:schemeClr val="tx1">
+                    <a:lumMod val="75000"/>
+                    <a:lumOff val="25000"/>
+                  </a:schemeClr>
+                </a:solidFill>
+                <a:cs typeface="Lato" panose="020F0502020204030203" pitchFamily="34" charset="0"/>
+              </a:rPr>
+              <a:t>Développement web et logiciel principalement en C, C#.</a:t>
+            </a:r>
+          </a:p>
+        </p:txBody>
+      </p:sp>
+      <p:sp>
+        <p:nvSpPr>
+          <p:cNvPr id="59" name="TextBox 89">
+            <a:extLst>
+              <a:ext uri="{FF2B5EF4-FFF2-40B4-BE49-F238E27FC236}">
+                <a16:creationId xmlns:a16="http://schemas.microsoft.com/office/drawing/2014/main" id="{1EDE6518-C0ED-4AD7-AE20-2EB3A1E2ED09}"/>
+              </a:ext>
+            </a:extLst>
+          </p:cNvPr>
+          <p:cNvSpPr txBox="1"/>
+          <p:nvPr/>
+        </p:nvSpPr>
+        <p:spPr>
+          <a:xfrm>
+            <a:off x="6394523" y="8615441"/>
+            <a:ext cx="892491" cy="261610"/>
+          </a:xfrm>
+          <a:prstGeom prst="rect">
+            <a:avLst/>
+          </a:prstGeom>
+          <a:noFill/>
+        </p:spPr>
+        <p:txBody>
+          <a:bodyPr wrap="square" rtlCol="0">
+            <a:spAutoFit/>
+          </a:bodyPr>
+          <a:lstStyle/>
+          <a:p>
+            <a:r>
+              <a:rPr lang="en-PH" sz="1100" dirty="0">
+                <a:solidFill>
+                  <a:schemeClr val="tx1">
+                    <a:lumMod val="75000"/>
+                    <a:lumOff val="25000"/>
+                  </a:schemeClr>
+                </a:solidFill>
+                <a:cs typeface="Lato" panose="020F0502020204030203" pitchFamily="34" charset="0"/>
+              </a:rPr>
+              <a:t>2018 - 2019</a:t>
+            </a:r>
+          </a:p>
+        </p:txBody>
+      </p:sp>
     </p:spTree>
     <p:extLst>
       <p:ext uri="{BB962C8B-B14F-4D97-AF65-F5344CB8AC3E}">

</xml_diff>